<commit_message>
Youtube presentation for Finite State Machines
</commit_message>
<xml_diff>
--- a/Moose Training/Presentations/Core/FSM/MOOSE - FSM.pptx
+++ b/Moose Training/Presentations/Core/FSM/MOOSE - FSM.pptx
@@ -8262,8 +8262,12 @@
               <a:t> </a:t>
             </a:r>
             <a:r>
-              <a:rPr lang="nl-BE" sz="1400" i="1"/>
-              <a:t>calling </a:t>
+              <a:rPr lang="nl-BE" sz="1400" i="1" dirty="0" err="1"/>
+              <a:t>calling</a:t>
+            </a:r>
+            <a:r>
+              <a:rPr lang="nl-BE" sz="1400" i="1" dirty="0"/>
+              <a:t> </a:t>
             </a:r>
             <a:r>
               <a:rPr lang="nl-BE" sz="1400" i="1" dirty="0" err="1"/>

</xml_diff>